<commit_message>
Add pdf for Termine 6 and 7
</commit_message>
<xml_diff>
--- a/Termin_6/folien/UebungModellierung#6.pptx
+++ b/Termin_6/folien/UebungModellierung#6.pptx
@@ -5,10 +5,10 @@
     <p:sldMasterId id="2147483648" r:id="rId1"/>
   </p:sldMasterIdLst>
   <p:notesMasterIdLst>
-    <p:notesMasterId r:id="rId11"/>
+    <p:notesMasterId r:id="rId12"/>
   </p:notesMasterIdLst>
   <p:handoutMasterIdLst>
-    <p:handoutMasterId r:id="rId12"/>
+    <p:handoutMasterId r:id="rId13"/>
   </p:handoutMasterIdLst>
   <p:sldIdLst>
     <p:sldId id="892" r:id="rId2"/>
@@ -19,21 +19,22 @@
     <p:sldId id="985" r:id="rId7"/>
     <p:sldId id="987" r:id="rId8"/>
     <p:sldId id="986" r:id="rId9"/>
-    <p:sldId id="984" r:id="rId10"/>
+    <p:sldId id="988" r:id="rId10"/>
+    <p:sldId id="984" r:id="rId11"/>
   </p:sldIdLst>
   <p:sldSz cx="9144000" cy="6858000" type="screen4x3"/>
   <p:notesSz cx="7099300" cy="9601200"/>
   <p:embeddedFontLst>
     <p:embeddedFont>
       <p:font typeface="Calibri" pitchFamily="34" charset="0"/>
-      <p:regular r:id="rId13"/>
-      <p:bold r:id="rId14"/>
-      <p:italic r:id="rId15"/>
-      <p:boldItalic r:id="rId16"/>
+      <p:regular r:id="rId14"/>
+      <p:bold r:id="rId15"/>
+      <p:italic r:id="rId16"/>
+      <p:boldItalic r:id="rId17"/>
     </p:embeddedFont>
     <p:embeddedFont>
       <p:font typeface="MV Boli" pitchFamily="2" charset="0"/>
-      <p:regular r:id="rId17"/>
+      <p:regular r:id="rId18"/>
     </p:embeddedFont>
   </p:embeddedFontLst>
   <p:defaultTextStyle>
@@ -979,6 +980,108 @@
 </p:notes>
 </file>
 
+<file path=ppt/notesSlides/notesSlide10.xml><?xml version="1.0" encoding="utf-8"?>
+<p:notes xmlns:a="http://schemas.openxmlformats.org/drawingml/2006/main" xmlns:r="http://schemas.openxmlformats.org/officeDocument/2006/relationships" xmlns:p="http://schemas.openxmlformats.org/presentationml/2006/main">
+  <p:cSld>
+    <p:spTree>
+      <p:nvGrpSpPr>
+        <p:cNvPr id="1" name=""/>
+        <p:cNvGrpSpPr/>
+        <p:nvPr/>
+      </p:nvGrpSpPr>
+      <p:grpSpPr>
+        <a:xfrm>
+          <a:off x="0" y="0"/>
+          <a:ext cx="0" cy="0"/>
+          <a:chOff x="0" y="0"/>
+          <a:chExt cx="0" cy="0"/>
+        </a:xfrm>
+      </p:grpSpPr>
+      <p:sp>
+        <p:nvSpPr>
+          <p:cNvPr id="54274" name="Rectangle 7"/>
+          <p:cNvSpPr>
+            <a:spLocks noGrp="1" noChangeArrowheads="1"/>
+          </p:cNvSpPr>
+          <p:nvPr>
+            <p:ph type="sldNum" sz="quarter" idx="5"/>
+          </p:nvPr>
+        </p:nvSpPr>
+        <p:spPr/>
+        <p:txBody>
+          <a:bodyPr/>
+          <a:lstStyle/>
+          <a:p>
+            <a:pPr>
+              <a:defRPr/>
+            </a:pPr>
+            <a:fld id="{10FECC1A-FDCF-43AB-8611-DC3836B8FF46}" type="slidenum">
+              <a:rPr lang="de-DE" smtClean="0"/>
+              <a:pPr>
+                <a:defRPr/>
+              </a:pPr>
+              <a:t>10</a:t>
+            </a:fld>
+            <a:endParaRPr lang="de-DE" smtClean="0"/>
+          </a:p>
+        </p:txBody>
+      </p:sp>
+      <p:sp>
+        <p:nvSpPr>
+          <p:cNvPr id="28675" name="Rectangle 2"/>
+          <p:cNvSpPr>
+            <a:spLocks noGrp="1" noRot="1" noChangeAspect="1" noChangeArrowheads="1" noTextEdit="1"/>
+          </p:cNvSpPr>
+          <p:nvPr>
+            <p:ph type="sldImg"/>
+          </p:nvPr>
+        </p:nvSpPr>
+        <p:spPr>
+          <a:xfrm>
+            <a:off x="1152525" y="720725"/>
+            <a:ext cx="4799013" cy="3598863"/>
+          </a:xfrm>
+          <a:ln/>
+        </p:spPr>
+      </p:sp>
+      <p:sp>
+        <p:nvSpPr>
+          <p:cNvPr id="28676" name="Rectangle 3"/>
+          <p:cNvSpPr>
+            <a:spLocks noGrp="1" noChangeArrowheads="1"/>
+          </p:cNvSpPr>
+          <p:nvPr>
+            <p:ph type="body" idx="1"/>
+          </p:nvPr>
+        </p:nvSpPr>
+        <p:spPr>
+          <a:xfrm>
+            <a:off x="946150" y="4559300"/>
+            <a:ext cx="5207000" cy="4321175"/>
+          </a:xfrm>
+          <a:noFill/>
+          <a:ln/>
+        </p:spPr>
+        <p:txBody>
+          <a:bodyPr/>
+          <a:lstStyle/>
+          <a:p>
+            <a:pPr eaLnBrk="1" hangingPunct="1"/>
+            <a:r>
+              <a:rPr lang="en-US" dirty="0" smtClean="0"/>
+              <a:t>This is the main motivation…</a:t>
+            </a:r>
+          </a:p>
+        </p:txBody>
+      </p:sp>
+    </p:spTree>
+  </p:cSld>
+  <p:clrMapOvr>
+    <a:masterClrMapping/>
+  </p:clrMapOvr>
+</p:notes>
+</file>
+
 <file path=ppt/notesSlides/notesSlide2.xml><?xml version="1.0" encoding="utf-8"?>
 <p:notes xmlns:a="http://schemas.openxmlformats.org/drawingml/2006/main" xmlns:r="http://schemas.openxmlformats.org/officeDocument/2006/relationships" xmlns:p="http://schemas.openxmlformats.org/presentationml/2006/main">
   <p:cSld>
@@ -3696,7 +3799,7 @@
                 <a:latin typeface="Calibri" pitchFamily="34" charset="0"/>
                 <a:cs typeface="+mn-cs"/>
               </a:rPr>
-              <a:t>Seminar „Einführung in die Modellierung“, Wintersemester 2016/17                 #</a:t>
+              <a:t>Seminar „Einführung in die Modellierung“			            #</a:t>
             </a:r>
             <a:fld id="{19621714-58BB-457A-826B-841F6E217726}" type="slidenum">
               <a:rPr lang="de-DE" noProof="0" smtClean="0">
@@ -4223,7 +4326,7 @@
               <a:rPr lang="de-DE" sz="3600" dirty="0" smtClean="0">
                 <a:latin typeface="Calibri" pitchFamily="34" charset="0"/>
               </a:rPr>
-              <a:t>Wintersemester 2016/17</a:t>
+              <a:t>Wintersemester 2017/18</a:t>
             </a:r>
           </a:p>
           <a:p>
@@ -4624,6 +4727,110 @@
 </p:sld>
 </file>
 
+<file path=ppt/slides/slide10.xml><?xml version="1.0" encoding="utf-8"?>
+<p:sld xmlns:a="http://schemas.openxmlformats.org/drawingml/2006/main" xmlns:r="http://schemas.openxmlformats.org/officeDocument/2006/relationships" xmlns:p="http://schemas.openxmlformats.org/presentationml/2006/main">
+  <p:cSld>
+    <p:spTree>
+      <p:nvGrpSpPr>
+        <p:cNvPr id="1" name=""/>
+        <p:cNvGrpSpPr/>
+        <p:nvPr/>
+      </p:nvGrpSpPr>
+      <p:grpSpPr>
+        <a:xfrm>
+          <a:off x="0" y="0"/>
+          <a:ext cx="0" cy="0"/>
+          <a:chOff x="0" y="0"/>
+          <a:chExt cx="0" cy="0"/>
+        </a:xfrm>
+      </p:grpSpPr>
+      <p:sp>
+        <p:nvSpPr>
+          <p:cNvPr id="13" name="Textfeld 12"/>
+          <p:cNvSpPr txBox="1"/>
+          <p:nvPr/>
+        </p:nvSpPr>
+        <p:spPr>
+          <a:xfrm>
+            <a:off x="1" y="-21515"/>
+            <a:ext cx="9108504" cy="476250"/>
+          </a:xfrm>
+          <a:prstGeom prst="rect">
+            <a:avLst/>
+          </a:prstGeom>
+          <a:noFill/>
+          <a:effectLst/>
+        </p:spPr>
+        <p:txBody>
+          <a:bodyPr wrap="square" lIns="0" rIns="0" rtlCol="0">
+            <a:noAutofit/>
+          </a:bodyPr>
+          <a:lstStyle/>
+          <a:p>
+            <a:pPr algn="ctr">
+              <a:spcAft>
+                <a:spcPts val="0"/>
+              </a:spcAft>
+              <a:defRPr/>
+            </a:pPr>
+            <a:r>
+              <a:rPr lang="de-DE" sz="2800" dirty="0" smtClean="0">
+                <a:solidFill>
+                  <a:schemeClr val="bg1">
+                    <a:lumMod val="85000"/>
+                  </a:schemeClr>
+                </a:solidFill>
+                <a:latin typeface="Calibri" pitchFamily="34" charset="0"/>
+              </a:rPr>
+              <a:t>Kalibrierung und Validierung</a:t>
+            </a:r>
+          </a:p>
+        </p:txBody>
+      </p:sp>
+      <p:pic>
+        <p:nvPicPr>
+          <p:cNvPr id="4100" name="Picture 4" descr="http://4.bp.blogspot.com/-ZJngZgD6GiE/TeuTaeyRB9I/AAAAAAAAAZ0/tfQ15EtrPpE/s1600/Quiz%2BKids%2B01.jpg"/>
+          <p:cNvPicPr>
+            <a:picLocks noChangeAspect="1" noChangeArrowheads="1"/>
+          </p:cNvPicPr>
+          <p:nvPr/>
+        </p:nvPicPr>
+        <p:blipFill>
+          <a:blip r:embed="rId3" cstate="print"/>
+          <a:srcRect l="5222" r="5218"/>
+          <a:stretch>
+            <a:fillRect/>
+          </a:stretch>
+        </p:blipFill>
+        <p:spPr bwMode="auto">
+          <a:xfrm>
+            <a:off x="-1" y="-1"/>
+            <a:ext cx="9200499" cy="6856413"/>
+          </a:xfrm>
+          <a:prstGeom prst="rect">
+            <a:avLst/>
+          </a:prstGeom>
+          <a:noFill/>
+        </p:spPr>
+      </p:pic>
+    </p:spTree>
+  </p:cSld>
+  <p:clrMapOvr>
+    <a:masterClrMapping/>
+  </p:clrMapOvr>
+  <p:transition>
+    <p:zoom/>
+  </p:transition>
+  <p:timing>
+    <p:tnLst>
+      <p:par>
+        <p:cTn id="1" dur="indefinite" restart="never" nodeType="tmRoot"/>
+      </p:par>
+    </p:tnLst>
+  </p:timing>
+</p:sld>
+</file>
+
 <file path=ppt/slides/slide2.xml><?xml version="1.0" encoding="utf-8"?>
 <p:sld xmlns:a="http://schemas.openxmlformats.org/drawingml/2006/main" xmlns:r="http://schemas.openxmlformats.org/officeDocument/2006/relationships" xmlns:p="http://schemas.openxmlformats.org/presentationml/2006/main" showMasterSp="0">
   <p:cSld>
@@ -4672,7 +4879,7 @@
               <a:rPr lang="de-DE" sz="3600" dirty="0" smtClean="0">
                 <a:latin typeface="Calibri" pitchFamily="34" charset="0"/>
               </a:rPr>
-              <a:t>Wintersemester 2016/17</a:t>
+              <a:t>Wintersemester 2017/18</a:t>
             </a:r>
           </a:p>
           <a:p>
@@ -5013,7 +5220,7 @@
               <a:rPr lang="de-DE" sz="3600" dirty="0" smtClean="0">
                 <a:latin typeface="Calibri" pitchFamily="34" charset="0"/>
               </a:rPr>
-              <a:t>Wintersemester 2016/17</a:t>
+              <a:t>Wintersemester 2017/18</a:t>
             </a:r>
           </a:p>
           <a:p>
@@ -5285,9 +5492,6 @@
               </a:rPr>
               <a:t>o-Quiz</a:t>
             </a:r>
-            <a:endParaRPr lang="de-DE" sz="2400" dirty="0" smtClean="0">
-              <a:latin typeface="Calibri" pitchFamily="34" charset="0"/>
-            </a:endParaRPr>
           </a:p>
         </p:txBody>
       </p:sp>
@@ -6374,19 +6578,7 @@
               <a:rPr lang="de-DE" sz="2000" dirty="0" smtClean="0">
                 <a:latin typeface="Calibri" pitchFamily="34" charset="0"/>
               </a:rPr>
-              <a:t>Einfluss der </a:t>
-            </a:r>
-            <a:r>
-              <a:rPr lang="de-DE" sz="2000" dirty="0" smtClean="0">
-                <a:latin typeface="Calibri" pitchFamily="34" charset="0"/>
-              </a:rPr>
-              <a:t>Gebietsfeuchte</a:t>
-            </a:r>
-            <a:r>
-              <a:rPr lang="de-DE" sz="2000" dirty="0" smtClean="0">
-                <a:latin typeface="Calibri" pitchFamily="34" charset="0"/>
-              </a:rPr>
-              <a:t/>
+              <a:t>Einfluss der Gebietsfeuchte</a:t>
             </a:r>
             <a:br>
               <a:rPr lang="de-DE" sz="2000" dirty="0" smtClean="0">
@@ -12446,6 +12638,103 @@
           <a:chExt cx="0" cy="0"/>
         </a:xfrm>
       </p:grpSpPr>
+      <p:pic>
+        <p:nvPicPr>
+          <p:cNvPr id="112648" name="Picture 8"/>
+          <p:cNvPicPr>
+            <a:picLocks noChangeAspect="1" noChangeArrowheads="1"/>
+          </p:cNvPicPr>
+          <p:nvPr/>
+        </p:nvPicPr>
+        <p:blipFill>
+          <a:blip r:embed="rId3" cstate="print"/>
+          <a:srcRect/>
+          <a:stretch>
+            <a:fillRect/>
+          </a:stretch>
+        </p:blipFill>
+        <p:spPr bwMode="auto">
+          <a:xfrm>
+            <a:off x="34925" y="1124744"/>
+            <a:ext cx="9101167" cy="5112568"/>
+          </a:xfrm>
+          <a:prstGeom prst="rect">
+            <a:avLst/>
+          </a:prstGeom>
+          <a:noFill/>
+          <a:ln w="9525">
+            <a:noFill/>
+            <a:miter lim="800000"/>
+            <a:headEnd/>
+            <a:tailEnd/>
+          </a:ln>
+        </p:spPr>
+      </p:pic>
+      <p:sp>
+        <p:nvSpPr>
+          <p:cNvPr id="11" name="Rechteck 10"/>
+          <p:cNvSpPr/>
+          <p:nvPr/>
+        </p:nvSpPr>
+        <p:spPr bwMode="auto">
+          <a:xfrm>
+            <a:off x="0" y="5157192"/>
+            <a:ext cx="5940152" cy="792088"/>
+          </a:xfrm>
+          <a:prstGeom prst="rect">
+            <a:avLst/>
+          </a:prstGeom>
+          <a:solidFill>
+            <a:srgbClr val="FFFFFF">
+              <a:alpha val="80000"/>
+            </a:srgbClr>
+          </a:solidFill>
+          <a:ln w="19050" cap="flat" cmpd="sng" algn="ctr">
+            <a:noFill/>
+            <a:prstDash val="solid"/>
+            <a:round/>
+            <a:headEnd type="none" w="med" len="med"/>
+            <a:tailEnd type="none" w="med" len="med"/>
+          </a:ln>
+          <a:effectLst/>
+        </p:spPr>
+        <p:txBody>
+          <a:bodyPr vert="horz" wrap="square" lIns="91440" tIns="45720" rIns="91440" bIns="45720" numCol="1" rtlCol="0" anchor="t" anchorCtr="0" compatLnSpc="1">
+            <a:prstTxWarp prst="textNoShape">
+              <a:avLst/>
+            </a:prstTxWarp>
+          </a:bodyPr>
+          <a:lstStyle/>
+          <a:p>
+            <a:pPr marL="0" marR="0" indent="0" algn="l" defTabSz="914400" rtl="0" eaLnBrk="1" fontAlgn="base" latinLnBrk="0" hangingPunct="1">
+              <a:lnSpc>
+                <a:spcPct val="100000"/>
+              </a:lnSpc>
+              <a:spcBef>
+                <a:spcPct val="0"/>
+              </a:spcBef>
+              <a:spcAft>
+                <a:spcPct val="0"/>
+              </a:spcAft>
+              <a:buClrTx/>
+              <a:buSzTx/>
+              <a:buFontTx/>
+              <a:buNone/>
+              <a:tabLst/>
+            </a:pPr>
+            <a:endParaRPr kumimoji="0" lang="de-DE" sz="1600" b="0" i="0" u="none" strike="noStrike" cap="none" normalizeH="0" baseline="0" smtClean="0">
+              <a:ln>
+                <a:noFill/>
+              </a:ln>
+              <a:solidFill>
+                <a:schemeClr val="tx1"/>
+              </a:solidFill>
+              <a:effectLst/>
+              <a:latin typeface="Arial" charset="0"/>
+            </a:endParaRPr>
+          </a:p>
+        </p:txBody>
+      </p:sp>
       <p:sp>
         <p:nvSpPr>
           <p:cNvPr id="13" name="Textfeld 12"/>
@@ -12484,35 +12773,422 @@
                 </a:solidFill>
                 <a:latin typeface="Calibri" pitchFamily="34" charset="0"/>
               </a:rPr>
-              <a:t>Kalibrierung und Validierung</a:t>
-            </a:r>
+              <a:t>MOPEX</a:t>
+            </a:r>
+          </a:p>
+        </p:txBody>
+      </p:sp>
+      <p:sp>
+        <p:nvSpPr>
+          <p:cNvPr id="28" name="Textfeld 27"/>
+          <p:cNvSpPr txBox="1"/>
+          <p:nvPr/>
+        </p:nvSpPr>
+        <p:spPr>
+          <a:xfrm>
+            <a:off x="395288" y="765175"/>
+            <a:ext cx="8209037" cy="523220"/>
+          </a:xfrm>
+          <a:prstGeom prst="rect">
+            <a:avLst/>
+          </a:prstGeom>
+          <a:noFill/>
+        </p:spPr>
+        <p:txBody>
+          <a:bodyPr wrap="square" rtlCol="0">
+            <a:spAutoFit/>
+          </a:bodyPr>
+          <a:lstStyle/>
+          <a:p>
+            <a:r>
+              <a:rPr lang="de-DE" sz="2800" dirty="0" smtClean="0">
+                <a:latin typeface="Calibri" pitchFamily="34" charset="0"/>
+              </a:rPr>
+              <a:t>MOPEX: </a:t>
+            </a:r>
+            <a:r>
+              <a:rPr lang="de-DE" sz="2800" b="1" dirty="0" err="1" smtClean="0">
+                <a:latin typeface="Calibri" pitchFamily="34" charset="0"/>
+              </a:rPr>
+              <a:t>MO</a:t>
+            </a:r>
+            <a:r>
+              <a:rPr lang="de-DE" sz="2800" dirty="0" err="1" smtClean="0">
+                <a:latin typeface="Calibri" pitchFamily="34" charset="0"/>
+              </a:rPr>
+              <a:t>del</a:t>
+            </a:r>
+            <a:r>
+              <a:rPr lang="de-DE" sz="2800" dirty="0" smtClean="0">
+                <a:latin typeface="Calibri" pitchFamily="34" charset="0"/>
+              </a:rPr>
+              <a:t> </a:t>
+            </a:r>
+            <a:r>
+              <a:rPr lang="de-DE" sz="2800" b="1" dirty="0" smtClean="0">
+                <a:latin typeface="Calibri" pitchFamily="34" charset="0"/>
+              </a:rPr>
+              <a:t>P</a:t>
+            </a:r>
+            <a:r>
+              <a:rPr lang="de-DE" sz="2800" dirty="0" smtClean="0">
+                <a:latin typeface="Calibri" pitchFamily="34" charset="0"/>
+              </a:rPr>
+              <a:t>arameter </a:t>
+            </a:r>
+            <a:r>
+              <a:rPr lang="de-DE" sz="2800" b="1" dirty="0" err="1" smtClean="0">
+                <a:latin typeface="Calibri" pitchFamily="34" charset="0"/>
+              </a:rPr>
+              <a:t>E</a:t>
+            </a:r>
+            <a:r>
+              <a:rPr lang="de-DE" sz="2800" dirty="0" err="1" smtClean="0">
+                <a:latin typeface="Calibri" pitchFamily="34" charset="0"/>
+              </a:rPr>
+              <a:t>stimation</a:t>
+            </a:r>
+            <a:r>
+              <a:rPr lang="de-DE" sz="2800" dirty="0" smtClean="0">
+                <a:latin typeface="Calibri" pitchFamily="34" charset="0"/>
+              </a:rPr>
+              <a:t> </a:t>
+            </a:r>
+            <a:r>
+              <a:rPr lang="de-DE" sz="2800" dirty="0" err="1" smtClean="0">
+                <a:latin typeface="Calibri" pitchFamily="34" charset="0"/>
+              </a:rPr>
+              <a:t>E</a:t>
+            </a:r>
+            <a:r>
+              <a:rPr lang="de-DE" sz="2800" b="1" dirty="0" err="1" smtClean="0">
+                <a:latin typeface="Calibri" pitchFamily="34" charset="0"/>
+              </a:rPr>
+              <a:t>X</a:t>
+            </a:r>
+            <a:r>
+              <a:rPr lang="de-DE" sz="2800" dirty="0" err="1" smtClean="0">
+                <a:latin typeface="Calibri" pitchFamily="34" charset="0"/>
+              </a:rPr>
+              <a:t>periment</a:t>
+            </a:r>
+            <a:endParaRPr lang="de-DE" sz="2800" dirty="0">
+              <a:latin typeface="Calibri" pitchFamily="34" charset="0"/>
+            </a:endParaRPr>
+          </a:p>
+        </p:txBody>
+      </p:sp>
+      <p:sp>
+        <p:nvSpPr>
+          <p:cNvPr id="36" name="Textfeld 35"/>
+          <p:cNvSpPr txBox="1"/>
+          <p:nvPr/>
+        </p:nvSpPr>
+        <p:spPr>
+          <a:xfrm>
+            <a:off x="395288" y="1484313"/>
+            <a:ext cx="8569325" cy="1800493"/>
+          </a:xfrm>
+          <a:prstGeom prst="rect">
+            <a:avLst/>
+          </a:prstGeom>
+          <a:solidFill>
+            <a:srgbClr val="FFFFFF">
+              <a:alpha val="50196"/>
+            </a:srgbClr>
+          </a:solidFill>
+        </p:spPr>
+        <p:txBody>
+          <a:bodyPr wrap="square" rtlCol="0">
+            <a:spAutoFit/>
+          </a:bodyPr>
+          <a:lstStyle/>
+          <a:p>
+            <a:pPr marL="355600" indent="-355600">
+              <a:spcAft>
+                <a:spcPts val="600"/>
+              </a:spcAft>
+              <a:buFont typeface="Wingdings" pitchFamily="2" charset="2"/>
+              <a:buChar char="§"/>
+            </a:pPr>
+            <a:r>
+              <a:rPr lang="de-DE" sz="2400" dirty="0" smtClean="0">
+                <a:latin typeface="Calibri" pitchFamily="34" charset="0"/>
+              </a:rPr>
+              <a:t>homogener Datensatz für 431 Einzugsgebiete in den USA</a:t>
+            </a:r>
+          </a:p>
+          <a:p>
+            <a:pPr marL="355600" indent="-355600">
+              <a:spcAft>
+                <a:spcPts val="600"/>
+              </a:spcAft>
+              <a:buFont typeface="Wingdings" pitchFamily="2" charset="2"/>
+              <a:buChar char="§"/>
+            </a:pPr>
+            <a:r>
+              <a:rPr lang="de-DE" sz="2400" dirty="0" smtClean="0">
+                <a:latin typeface="Calibri" pitchFamily="34" charset="0"/>
+              </a:rPr>
+              <a:t>Abflusszeitreihen</a:t>
+            </a:r>
+          </a:p>
+          <a:p>
+            <a:pPr marL="355600" indent="-355600">
+              <a:spcAft>
+                <a:spcPts val="600"/>
+              </a:spcAft>
+              <a:buFont typeface="Wingdings" pitchFamily="2" charset="2"/>
+              <a:buChar char="§"/>
+            </a:pPr>
+            <a:r>
+              <a:rPr lang="de-DE" sz="2400" dirty="0" smtClean="0">
+                <a:latin typeface="Calibri" pitchFamily="34" charset="0"/>
+              </a:rPr>
+              <a:t>Gebietsmittelwerte für Niederschlag, PET, </a:t>
+            </a:r>
+            <a:r>
+              <a:rPr lang="de-DE" sz="2400" dirty="0" err="1" smtClean="0">
+                <a:latin typeface="Calibri" pitchFamily="34" charset="0"/>
+              </a:rPr>
+              <a:t>T</a:t>
+            </a:r>
+            <a:r>
+              <a:rPr lang="de-DE" sz="2400" baseline="-25000" dirty="0" err="1" smtClean="0">
+                <a:latin typeface="Calibri" pitchFamily="34" charset="0"/>
+              </a:rPr>
+              <a:t>min</a:t>
+            </a:r>
+            <a:r>
+              <a:rPr lang="de-DE" sz="2400" dirty="0" smtClean="0">
+                <a:latin typeface="Calibri" pitchFamily="34" charset="0"/>
+              </a:rPr>
+              <a:t>, </a:t>
+            </a:r>
+            <a:r>
+              <a:rPr lang="de-DE" sz="2400" dirty="0" err="1" smtClean="0">
+                <a:latin typeface="Calibri" pitchFamily="34" charset="0"/>
+              </a:rPr>
+              <a:t>T</a:t>
+            </a:r>
+            <a:r>
+              <a:rPr lang="de-DE" sz="2400" baseline="-25000" dirty="0" err="1" smtClean="0">
+                <a:latin typeface="Calibri" pitchFamily="34" charset="0"/>
+              </a:rPr>
+              <a:t>max</a:t>
+            </a:r>
+            <a:endParaRPr lang="de-DE" sz="2400" baseline="-25000" dirty="0" smtClean="0">
+              <a:latin typeface="Calibri" pitchFamily="34" charset="0"/>
+            </a:endParaRPr>
+          </a:p>
+          <a:p>
+            <a:pPr marL="355600" indent="-355600">
+              <a:spcAft>
+                <a:spcPts val="600"/>
+              </a:spcAft>
+              <a:buFont typeface="Wingdings" pitchFamily="2" charset="2"/>
+              <a:buChar char="§"/>
+            </a:pPr>
+            <a:r>
+              <a:rPr lang="de-DE" sz="2400" dirty="0" smtClean="0">
+                <a:latin typeface="Calibri" pitchFamily="34" charset="0"/>
+              </a:rPr>
+              <a:t>tägliche Auflösung (für diesen Kurs: Monatsmittelwerte)</a:t>
+            </a:r>
+          </a:p>
+        </p:txBody>
+      </p:sp>
+      <p:grpSp>
+        <p:nvGrpSpPr>
+          <p:cNvPr id="2" name="Gruppieren 10"/>
+          <p:cNvGrpSpPr/>
+          <p:nvPr/>
+        </p:nvGrpSpPr>
+        <p:grpSpPr>
+          <a:xfrm>
+            <a:off x="0" y="3717032"/>
+            <a:ext cx="9144000" cy="1080120"/>
+            <a:chOff x="0" y="3717032"/>
+            <a:chExt cx="9144000" cy="1080120"/>
+          </a:xfrm>
+        </p:grpSpPr>
+        <p:sp>
+          <p:nvSpPr>
+            <p:cNvPr id="43" name="Textfeld 42"/>
+            <p:cNvSpPr txBox="1"/>
+            <p:nvPr/>
+          </p:nvSpPr>
+          <p:spPr>
+            <a:xfrm>
+              <a:off x="0" y="4243154"/>
+              <a:ext cx="9144000" cy="553998"/>
+            </a:xfrm>
+            <a:prstGeom prst="rect">
+              <a:avLst/>
+            </a:prstGeom>
+            <a:solidFill>
+              <a:srgbClr val="FFFFFF">
+                <a:alpha val="50196"/>
+              </a:srgbClr>
+            </a:solidFill>
+          </p:spPr>
+          <p:txBody>
+            <a:bodyPr wrap="square" rtlCol="0">
+              <a:spAutoFit/>
+            </a:bodyPr>
+            <a:lstStyle/>
+            <a:p>
+              <a:pPr algn="ctr"/>
+              <a:r>
+                <a:rPr lang="de-DE" sz="3000" dirty="0" smtClean="0">
+                  <a:latin typeface="Calibri" pitchFamily="34" charset="0"/>
+                  <a:hlinkClick r:id="rId4"/>
+                </a:rPr>
+                <a:t>ftp://hydrology.nws.noaa.gov/pub/gcip/mopex/US_Data</a:t>
+              </a:r>
+              <a:r>
+                <a:rPr lang="de-DE" sz="3000" dirty="0" smtClean="0">
+                  <a:latin typeface="Calibri" pitchFamily="34" charset="0"/>
+                </a:rPr>
+                <a:t> </a:t>
+              </a:r>
+              <a:endParaRPr lang="de-DE" sz="3000" dirty="0">
+                <a:latin typeface="Calibri" pitchFamily="34" charset="0"/>
+              </a:endParaRPr>
+            </a:p>
+          </p:txBody>
+        </p:sp>
+        <p:sp>
+          <p:nvSpPr>
+            <p:cNvPr id="44" name="Textfeld 43"/>
+            <p:cNvSpPr txBox="1"/>
+            <p:nvPr/>
+          </p:nvSpPr>
+          <p:spPr>
+            <a:xfrm>
+              <a:off x="0" y="3717032"/>
+              <a:ext cx="9144000" cy="553998"/>
+            </a:xfrm>
+            <a:prstGeom prst="rect">
+              <a:avLst/>
+            </a:prstGeom>
+            <a:solidFill>
+              <a:srgbClr val="FFFFFF">
+                <a:alpha val="50196"/>
+              </a:srgbClr>
+            </a:solidFill>
+          </p:spPr>
+          <p:txBody>
+            <a:bodyPr wrap="square" rtlCol="0">
+              <a:spAutoFit/>
+            </a:bodyPr>
+            <a:lstStyle/>
+            <a:p>
+              <a:pPr algn="ctr"/>
+              <a:r>
+                <a:rPr lang="de-DE" sz="3000" dirty="0" smtClean="0">
+                  <a:latin typeface="Calibri" pitchFamily="34" charset="0"/>
+                </a:rPr>
+                <a:t>Download der Daten und Metadaten: </a:t>
+              </a:r>
+              <a:endParaRPr lang="de-DE" sz="3000" dirty="0">
+                <a:latin typeface="Calibri" pitchFamily="34" charset="0"/>
+              </a:endParaRPr>
+            </a:p>
+          </p:txBody>
+        </p:sp>
+      </p:grpSp>
+      <p:sp>
+        <p:nvSpPr>
+          <p:cNvPr id="9" name="Text Box 4"/>
+          <p:cNvSpPr txBox="1">
+            <a:spLocks noChangeArrowheads="1"/>
+          </p:cNvSpPr>
+          <p:nvPr/>
+        </p:nvSpPr>
+        <p:spPr bwMode="auto">
+          <a:xfrm>
+            <a:off x="1099577" y="5389324"/>
+            <a:ext cx="7864911" cy="369332"/>
+          </a:xfrm>
+          <a:prstGeom prst="rect">
+            <a:avLst/>
+          </a:prstGeom>
+          <a:noFill/>
+          <a:ln w="9525">
+            <a:noFill/>
+            <a:miter lim="800000"/>
+            <a:headEnd/>
+            <a:tailEnd/>
+          </a:ln>
+        </p:spPr>
+        <p:txBody>
+          <a:bodyPr wrap="square">
+            <a:spAutoFit/>
+          </a:bodyPr>
+          <a:lstStyle/>
+          <a:p>
+            <a:pPr>
+              <a:buClr>
+                <a:schemeClr val="bg2"/>
+              </a:buClr>
+            </a:pPr>
+            <a:r>
+              <a:rPr lang="de-DE" sz="1800" dirty="0" smtClean="0">
+                <a:latin typeface="Calibri" pitchFamily="34" charset="0"/>
+              </a:rPr>
+              <a:t>Bearbeite die Aufgaben in </a:t>
+            </a:r>
+            <a:r>
+              <a:rPr lang="de-DE" sz="1800" dirty="0" err="1" smtClean="0">
+                <a:latin typeface="Courier" pitchFamily="49" charset="0"/>
+              </a:rPr>
+              <a:t>diagnose.R</a:t>
+            </a:r>
+            <a:r>
+              <a:rPr lang="de-DE" sz="1800" dirty="0" smtClean="0">
+                <a:latin typeface="Calibri" pitchFamily="34" charset="0"/>
+                <a:sym typeface="Symbol"/>
+              </a:rPr>
+              <a:t>.</a:t>
+            </a:r>
+            <a:endParaRPr lang="de-DE" sz="1800" baseline="-25000" dirty="0">
+              <a:latin typeface="Calibri" pitchFamily="34" charset="0"/>
+            </a:endParaRPr>
           </a:p>
         </p:txBody>
       </p:sp>
       <p:pic>
         <p:nvPicPr>
-          <p:cNvPr id="4100" name="Picture 4" descr="http://4.bp.blogspot.com/-ZJngZgD6GiE/TeuTaeyRB9I/AAAAAAAAAZ0/tfQ15EtrPpE/s1600/Quiz%2BKids%2B01.jpg"/>
+          <p:cNvPr id="10" name="Picture 8"/>
           <p:cNvPicPr>
             <a:picLocks noChangeAspect="1" noChangeArrowheads="1"/>
           </p:cNvPicPr>
           <p:nvPr/>
         </p:nvPicPr>
         <p:blipFill>
-          <a:blip r:embed="rId3" cstate="print"/>
-          <a:srcRect l="5222" r="5218"/>
+          <a:blip r:embed="rId5" cstate="print"/>
+          <a:srcRect/>
           <a:stretch>
             <a:fillRect/>
           </a:stretch>
         </p:blipFill>
         <p:spPr bwMode="auto">
           <a:xfrm>
-            <a:off x="-1" y="-1"/>
-            <a:ext cx="9200499" cy="6856413"/>
+            <a:off x="412367" y="5280000"/>
+            <a:ext cx="647476" cy="576064"/>
           </a:xfrm>
           <a:prstGeom prst="rect">
             <a:avLst/>
           </a:prstGeom>
           <a:noFill/>
+          <a:ln w="9525">
+            <a:noFill/>
+            <a:miter lim="800000"/>
+            <a:headEnd/>
+            <a:tailEnd/>
+          </a:ln>
+          <a:effectLst/>
         </p:spPr>
       </p:pic>
     </p:spTree>
@@ -12521,7 +13197,7 @@
     <a:masterClrMapping/>
   </p:clrMapOvr>
   <p:transition>
-    <p:zoom/>
+    <p:split/>
   </p:transition>
   <p:timing>
     <p:tnLst>

</xml_diff>